<commit_message>
finished for first week
</commit_message>
<xml_diff>
--- a/images/logo.pptx
+++ b/images/logo.pptx
@@ -6,6 +6,7 @@
   </p:sldMasterIdLst>
   <p:sldIdLst>
     <p:sldId id="256" r:id="rId2"/>
+    <p:sldId id="257" r:id="rId3"/>
   </p:sldIdLst>
   <p:sldSz cx="12192000" cy="6858000"/>
   <p:notesSz cx="6858000" cy="9144000"/>
@@ -115,7 +116,7 @@
 <file path=ppt/revisionInfo.xml><?xml version="1.0" encoding="utf-8"?>
 <p1510:revInfo xmlns:a="http://schemas.openxmlformats.org/drawingml/2006/main" xmlns:r="http://schemas.openxmlformats.org/officeDocument/2006/relationships" xmlns:p1510="http://schemas.microsoft.com/office/powerpoint/2015/10/main">
   <p1510:revLst>
-    <p1510:client id="{5DEBB3D2-491A-4101-AE89-3F13510DB1B1}" v="2" dt="2023-03-10T20:59:49.058"/>
+    <p1510:client id="{8B8B86D4-5301-4D44-A126-F2010A3749CB}" v="40" dt="2023-03-31T00:01:56.394"/>
   </p1510:revLst>
 </p1510:revInfo>
 </file>
@@ -178,6 +179,166 @@
       </pc:sldChg>
     </pc:docChg>
   </pc:docChgLst>
+  <pc:docChgLst>
+    <pc:chgData name="Jasmin König" userId="878937f5-fcbf-4e09-9e02-139cda3e1f03" providerId="ADAL" clId="{8B8B86D4-5301-4D44-A126-F2010A3749CB}"/>
+    <pc:docChg chg="undo custSel addSld modSld">
+      <pc:chgData name="Jasmin König" userId="878937f5-fcbf-4e09-9e02-139cda3e1f03" providerId="ADAL" clId="{8B8B86D4-5301-4D44-A126-F2010A3749CB}" dt="2023-03-31T00:02:14.428" v="199" actId="207"/>
+      <pc:docMkLst>
+        <pc:docMk/>
+      </pc:docMkLst>
+      <pc:sldChg chg="addSp delSp modSp new mod setBg">
+        <pc:chgData name="Jasmin König" userId="878937f5-fcbf-4e09-9e02-139cda3e1f03" providerId="ADAL" clId="{8B8B86D4-5301-4D44-A126-F2010A3749CB}" dt="2023-03-31T00:02:14.428" v="199" actId="207"/>
+        <pc:sldMkLst>
+          <pc:docMk/>
+          <pc:sldMk cId="2068298696" sldId="257"/>
+        </pc:sldMkLst>
+        <pc:spChg chg="add del mod">
+          <ac:chgData name="Jasmin König" userId="878937f5-fcbf-4e09-9e02-139cda3e1f03" providerId="ADAL" clId="{8B8B86D4-5301-4D44-A126-F2010A3749CB}" dt="2023-03-30T23:39:06.470" v="36" actId="478"/>
+          <ac:spMkLst>
+            <pc:docMk/>
+            <pc:sldMk cId="2068298696" sldId="257"/>
+            <ac:spMk id="10" creationId="{C21C2F9D-865A-518C-F47A-A63E960896B1}"/>
+          </ac:spMkLst>
+        </pc:spChg>
+        <pc:spChg chg="add mod">
+          <ac:chgData name="Jasmin König" userId="878937f5-fcbf-4e09-9e02-139cda3e1f03" providerId="ADAL" clId="{8B8B86D4-5301-4D44-A126-F2010A3749CB}" dt="2023-03-30T23:54:09.902" v="179" actId="1076"/>
+          <ac:spMkLst>
+            <pc:docMk/>
+            <pc:sldMk cId="2068298696" sldId="257"/>
+            <ac:spMk id="11" creationId="{DC139BC7-D039-6397-A7BF-14D11616897F}"/>
+          </ac:spMkLst>
+        </pc:spChg>
+        <pc:spChg chg="add mod">
+          <ac:chgData name="Jasmin König" userId="878937f5-fcbf-4e09-9e02-139cda3e1f03" providerId="ADAL" clId="{8B8B86D4-5301-4D44-A126-F2010A3749CB}" dt="2023-03-30T23:50:11.519" v="158" actId="1076"/>
+          <ac:spMkLst>
+            <pc:docMk/>
+            <pc:sldMk cId="2068298696" sldId="257"/>
+            <ac:spMk id="15" creationId="{042A46E2-CDAE-D282-8B53-1C7A13835030}"/>
+          </ac:spMkLst>
+        </pc:spChg>
+        <pc:spChg chg="add mod ord">
+          <ac:chgData name="Jasmin König" userId="878937f5-fcbf-4e09-9e02-139cda3e1f03" providerId="ADAL" clId="{8B8B86D4-5301-4D44-A126-F2010A3749CB}" dt="2023-03-31T00:02:14.428" v="199" actId="207"/>
+          <ac:spMkLst>
+            <pc:docMk/>
+            <pc:sldMk cId="2068298696" sldId="257"/>
+            <ac:spMk id="19" creationId="{33BF8DD2-1E9C-943B-E9C3-772EA47755ED}"/>
+          </ac:spMkLst>
+        </pc:spChg>
+        <pc:picChg chg="add mod modCrop">
+          <ac:chgData name="Jasmin König" userId="878937f5-fcbf-4e09-9e02-139cda3e1f03" providerId="ADAL" clId="{8B8B86D4-5301-4D44-A126-F2010A3749CB}" dt="2023-03-30T23:54:28.098" v="183" actId="1076"/>
+          <ac:picMkLst>
+            <pc:docMk/>
+            <pc:sldMk cId="2068298696" sldId="257"/>
+            <ac:picMk id="3" creationId="{ED4B1E32-A9CF-2293-EE46-76E39E150B53}"/>
+          </ac:picMkLst>
+        </pc:picChg>
+        <pc:picChg chg="add mod modCrop">
+          <ac:chgData name="Jasmin König" userId="878937f5-fcbf-4e09-9e02-139cda3e1f03" providerId="ADAL" clId="{8B8B86D4-5301-4D44-A126-F2010A3749CB}" dt="2023-03-30T23:50:39.447" v="164" actId="1076"/>
+          <ac:picMkLst>
+            <pc:docMk/>
+            <pc:sldMk cId="2068298696" sldId="257"/>
+            <ac:picMk id="5" creationId="{1297DF78-4975-0BC8-8A2B-2DF6D6B25C5E}"/>
+          </ac:picMkLst>
+        </pc:picChg>
+        <pc:picChg chg="add mod ord modCrop">
+          <ac:chgData name="Jasmin König" userId="878937f5-fcbf-4e09-9e02-139cda3e1f03" providerId="ADAL" clId="{8B8B86D4-5301-4D44-A126-F2010A3749CB}" dt="2023-03-30T23:54:22.686" v="182" actId="1076"/>
+          <ac:picMkLst>
+            <pc:docMk/>
+            <pc:sldMk cId="2068298696" sldId="257"/>
+            <ac:picMk id="13" creationId="{02800703-FE54-83AD-F3C1-D877F74D4845}"/>
+          </ac:picMkLst>
+        </pc:picChg>
+        <pc:picChg chg="add del mod modCrop">
+          <ac:chgData name="Jasmin König" userId="878937f5-fcbf-4e09-9e02-139cda3e1f03" providerId="ADAL" clId="{8B8B86D4-5301-4D44-A126-F2010A3749CB}" dt="2023-03-30T23:42:58.679" v="62" actId="478"/>
+          <ac:picMkLst>
+            <pc:docMk/>
+            <pc:sldMk cId="2068298696" sldId="257"/>
+            <ac:picMk id="14" creationId="{80597831-5973-30A4-0C39-F71315883DFD}"/>
+          </ac:picMkLst>
+        </pc:picChg>
+        <pc:picChg chg="add mod modCrop">
+          <ac:chgData name="Jasmin König" userId="878937f5-fcbf-4e09-9e02-139cda3e1f03" providerId="ADAL" clId="{8B8B86D4-5301-4D44-A126-F2010A3749CB}" dt="2023-03-30T23:48:54.240" v="140" actId="18131"/>
+          <ac:picMkLst>
+            <pc:docMk/>
+            <pc:sldMk cId="2068298696" sldId="257"/>
+            <ac:picMk id="16" creationId="{584826B3-3690-4C33-2CF0-1C1911AF00A7}"/>
+          </ac:picMkLst>
+        </pc:picChg>
+        <pc:picChg chg="add mod modCrop">
+          <ac:chgData name="Jasmin König" userId="878937f5-fcbf-4e09-9e02-139cda3e1f03" providerId="ADAL" clId="{8B8B86D4-5301-4D44-A126-F2010A3749CB}" dt="2023-03-30T23:54:19.418" v="181" actId="1076"/>
+          <ac:picMkLst>
+            <pc:docMk/>
+            <pc:sldMk cId="2068298696" sldId="257"/>
+            <ac:picMk id="17" creationId="{1FE2199C-AD2B-85BD-8F40-E5AA91655A88}"/>
+          </ac:picMkLst>
+        </pc:picChg>
+        <pc:picChg chg="add mod modCrop">
+          <ac:chgData name="Jasmin König" userId="878937f5-fcbf-4e09-9e02-139cda3e1f03" providerId="ADAL" clId="{8B8B86D4-5301-4D44-A126-F2010A3749CB}" dt="2023-03-30T23:50:43.695" v="165" actId="1076"/>
+          <ac:picMkLst>
+            <pc:docMk/>
+            <pc:sldMk cId="2068298696" sldId="257"/>
+            <ac:picMk id="18" creationId="{79136893-3785-ECA9-8481-321EB3263597}"/>
+          </ac:picMkLst>
+        </pc:picChg>
+        <pc:picChg chg="add del mod">
+          <ac:chgData name="Jasmin König" userId="878937f5-fcbf-4e09-9e02-139cda3e1f03" providerId="ADAL" clId="{8B8B86D4-5301-4D44-A126-F2010A3749CB}" dt="2023-03-30T23:58:00.128" v="187" actId="478"/>
+          <ac:picMkLst>
+            <pc:docMk/>
+            <pc:sldMk cId="2068298696" sldId="257"/>
+            <ac:picMk id="21" creationId="{8432263D-5307-EB4F-4DBC-DAF2B60A4C8B}"/>
+          </ac:picMkLst>
+        </pc:picChg>
+        <pc:picChg chg="add del">
+          <ac:chgData name="Jasmin König" userId="878937f5-fcbf-4e09-9e02-139cda3e1f03" providerId="ADAL" clId="{8B8B86D4-5301-4D44-A126-F2010A3749CB}" dt="2023-03-30T23:59:04.027" v="190" actId="478"/>
+          <ac:picMkLst>
+            <pc:docMk/>
+            <pc:sldMk cId="2068298696" sldId="257"/>
+            <ac:picMk id="23" creationId="{82DA384B-B758-8143-CC1A-22D4412945F9}"/>
+          </ac:picMkLst>
+        </pc:picChg>
+        <pc:picChg chg="add del">
+          <ac:chgData name="Jasmin König" userId="878937f5-fcbf-4e09-9e02-139cda3e1f03" providerId="ADAL" clId="{8B8B86D4-5301-4D44-A126-F2010A3749CB}" dt="2023-03-31T00:00:42.627" v="193" actId="478"/>
+          <ac:picMkLst>
+            <pc:docMk/>
+            <pc:sldMk cId="2068298696" sldId="257"/>
+            <ac:picMk id="25" creationId="{6766FF58-3980-0BA5-A80B-68A744D3C58A}"/>
+          </ac:picMkLst>
+        </pc:picChg>
+        <pc:picChg chg="add del mod">
+          <ac:chgData name="Jasmin König" userId="878937f5-fcbf-4e09-9e02-139cda3e1f03" providerId="ADAL" clId="{8B8B86D4-5301-4D44-A126-F2010A3749CB}" dt="2023-03-30T23:37:28.342" v="28" actId="478"/>
+          <ac:picMkLst>
+            <pc:docMk/>
+            <pc:sldMk cId="2068298696" sldId="257"/>
+            <ac:picMk id="1026" creationId="{F46EA496-E6D1-DF11-2510-C59F77D9AD13}"/>
+          </ac:picMkLst>
+        </pc:picChg>
+        <pc:picChg chg="add mod">
+          <ac:chgData name="Jasmin König" userId="878937f5-fcbf-4e09-9e02-139cda3e1f03" providerId="ADAL" clId="{8B8B86D4-5301-4D44-A126-F2010A3749CB}" dt="2023-03-30T23:54:06.713" v="178" actId="1076"/>
+          <ac:picMkLst>
+            <pc:docMk/>
+            <pc:sldMk cId="2068298696" sldId="257"/>
+            <ac:picMk id="1028" creationId="{455B14CF-5A65-117E-22AF-92E0FF41F00B}"/>
+          </ac:picMkLst>
+        </pc:picChg>
+        <pc:cxnChg chg="add del mod">
+          <ac:chgData name="Jasmin König" userId="878937f5-fcbf-4e09-9e02-139cda3e1f03" providerId="ADAL" clId="{8B8B86D4-5301-4D44-A126-F2010A3749CB}" dt="2023-03-30T23:34:57.653" v="20" actId="478"/>
+          <ac:cxnSpMkLst>
+            <pc:docMk/>
+            <pc:sldMk cId="2068298696" sldId="257"/>
+            <ac:cxnSpMk id="7" creationId="{CC717718-7090-2FDC-ED78-F4FCC9C829FE}"/>
+          </ac:cxnSpMkLst>
+        </pc:cxnChg>
+        <pc:cxnChg chg="add del mod">
+          <ac:chgData name="Jasmin König" userId="878937f5-fcbf-4e09-9e02-139cda3e1f03" providerId="ADAL" clId="{8B8B86D4-5301-4D44-A126-F2010A3749CB}" dt="2023-03-30T23:36:48.154" v="24" actId="478"/>
+          <ac:cxnSpMkLst>
+            <pc:docMk/>
+            <pc:sldMk cId="2068298696" sldId="257"/>
+            <ac:cxnSpMk id="9" creationId="{7EFC7523-F70B-931A-7B7E-B2D35CA26B3C}"/>
+          </ac:cxnSpMkLst>
+        </pc:cxnChg>
+      </pc:sldChg>
+    </pc:docChg>
+  </pc:docChgLst>
 </pc:chgInfo>
 </file>
 
@@ -328,7 +489,7 @@
           <a:p>
             <a:fld id="{4987CBED-97D0-4647-B451-48ECDCFC6274}" type="datetimeFigureOut">
               <a:rPr lang="de-DE" smtClean="0"/>
-              <a:t>10.03.2023</a:t>
+              <a:t>30.03.2023</a:t>
             </a:fld>
             <a:endParaRPr lang="de-DE"/>
           </a:p>
@@ -526,7 +687,7 @@
           <a:p>
             <a:fld id="{4987CBED-97D0-4647-B451-48ECDCFC6274}" type="datetimeFigureOut">
               <a:rPr lang="de-DE" smtClean="0"/>
-              <a:t>10.03.2023</a:t>
+              <a:t>30.03.2023</a:t>
             </a:fld>
             <a:endParaRPr lang="de-DE"/>
           </a:p>
@@ -734,7 +895,7 @@
           <a:p>
             <a:fld id="{4987CBED-97D0-4647-B451-48ECDCFC6274}" type="datetimeFigureOut">
               <a:rPr lang="de-DE" smtClean="0"/>
-              <a:t>10.03.2023</a:t>
+              <a:t>30.03.2023</a:t>
             </a:fld>
             <a:endParaRPr lang="de-DE"/>
           </a:p>
@@ -932,7 +1093,7 @@
           <a:p>
             <a:fld id="{4987CBED-97D0-4647-B451-48ECDCFC6274}" type="datetimeFigureOut">
               <a:rPr lang="de-DE" smtClean="0"/>
-              <a:t>10.03.2023</a:t>
+              <a:t>30.03.2023</a:t>
             </a:fld>
             <a:endParaRPr lang="de-DE"/>
           </a:p>
@@ -1207,7 +1368,7 @@
           <a:p>
             <a:fld id="{4987CBED-97D0-4647-B451-48ECDCFC6274}" type="datetimeFigureOut">
               <a:rPr lang="de-DE" smtClean="0"/>
-              <a:t>10.03.2023</a:t>
+              <a:t>30.03.2023</a:t>
             </a:fld>
             <a:endParaRPr lang="de-DE"/>
           </a:p>
@@ -1472,7 +1633,7 @@
           <a:p>
             <a:fld id="{4987CBED-97D0-4647-B451-48ECDCFC6274}" type="datetimeFigureOut">
               <a:rPr lang="de-DE" smtClean="0"/>
-              <a:t>10.03.2023</a:t>
+              <a:t>30.03.2023</a:t>
             </a:fld>
             <a:endParaRPr lang="de-DE"/>
           </a:p>
@@ -1884,7 +2045,7 @@
           <a:p>
             <a:fld id="{4987CBED-97D0-4647-B451-48ECDCFC6274}" type="datetimeFigureOut">
               <a:rPr lang="de-DE" smtClean="0"/>
-              <a:t>10.03.2023</a:t>
+              <a:t>30.03.2023</a:t>
             </a:fld>
             <a:endParaRPr lang="de-DE"/>
           </a:p>
@@ -2025,7 +2186,7 @@
           <a:p>
             <a:fld id="{4987CBED-97D0-4647-B451-48ECDCFC6274}" type="datetimeFigureOut">
               <a:rPr lang="de-DE" smtClean="0"/>
-              <a:t>10.03.2023</a:t>
+              <a:t>30.03.2023</a:t>
             </a:fld>
             <a:endParaRPr lang="de-DE"/>
           </a:p>
@@ -2138,7 +2299,7 @@
           <a:p>
             <a:fld id="{4987CBED-97D0-4647-B451-48ECDCFC6274}" type="datetimeFigureOut">
               <a:rPr lang="de-DE" smtClean="0"/>
-              <a:t>10.03.2023</a:t>
+              <a:t>30.03.2023</a:t>
             </a:fld>
             <a:endParaRPr lang="de-DE"/>
           </a:p>
@@ -2449,7 +2610,7 @@
           <a:p>
             <a:fld id="{4987CBED-97D0-4647-B451-48ECDCFC6274}" type="datetimeFigureOut">
               <a:rPr lang="de-DE" smtClean="0"/>
-              <a:t>10.03.2023</a:t>
+              <a:t>30.03.2023</a:t>
             </a:fld>
             <a:endParaRPr lang="de-DE"/>
           </a:p>
@@ -2737,7 +2898,7 @@
           <a:p>
             <a:fld id="{4987CBED-97D0-4647-B451-48ECDCFC6274}" type="datetimeFigureOut">
               <a:rPr lang="de-DE" smtClean="0"/>
-              <a:t>10.03.2023</a:t>
+              <a:t>30.03.2023</a:t>
             </a:fld>
             <a:endParaRPr lang="de-DE"/>
           </a:p>
@@ -2978,7 +3139,7 @@
           <a:p>
             <a:fld id="{4987CBED-97D0-4647-B451-48ECDCFC6274}" type="datetimeFigureOut">
               <a:rPr lang="de-DE" smtClean="0"/>
-              <a:t>10.03.2023</a:t>
+              <a:t>30.03.2023</a:t>
             </a:fld>
             <a:endParaRPr lang="de-DE"/>
           </a:p>
@@ -3525,6 +3686,1388 @@
 </p:sld>
 </file>
 
+<file path=ppt/slides/slide2.xml><?xml version="1.0" encoding="utf-8"?>
+<p:sld xmlns:a="http://schemas.openxmlformats.org/drawingml/2006/main" xmlns:r="http://schemas.openxmlformats.org/officeDocument/2006/relationships" xmlns:p="http://schemas.openxmlformats.org/presentationml/2006/main" showMasterSp="0">
+  <p:cSld>
+    <p:bg>
+      <p:bgPr>
+        <a:solidFill>
+          <a:schemeClr val="bg1"/>
+        </a:solidFill>
+        <a:effectLst/>
+      </p:bgPr>
+    </p:bg>
+    <p:spTree>
+      <p:nvGrpSpPr>
+        <p:cNvPr id="1" name=""/>
+        <p:cNvGrpSpPr/>
+        <p:nvPr/>
+      </p:nvGrpSpPr>
+      <p:grpSpPr>
+        <a:xfrm>
+          <a:off x="0" y="0"/>
+          <a:ext cx="0" cy="0"/>
+          <a:chOff x="0" y="0"/>
+          <a:chExt cx="0" cy="0"/>
+        </a:xfrm>
+      </p:grpSpPr>
+      <p:sp>
+        <p:nvSpPr>
+          <p:cNvPr id="19" name="Gleichschenkliges Dreieck 18">
+            <a:extLst>
+              <a:ext uri="{FF2B5EF4-FFF2-40B4-BE49-F238E27FC236}">
+                <a16:creationId xmlns:a16="http://schemas.microsoft.com/office/drawing/2014/main" id="{33BF8DD2-1E9C-943B-E9C3-772EA47755ED}"/>
+              </a:ext>
+            </a:extLst>
+          </p:cNvPr>
+          <p:cNvSpPr/>
+          <p:nvPr/>
+        </p:nvSpPr>
+        <p:spPr>
+          <a:xfrm flipV="1">
+            <a:off x="0" y="11201"/>
+            <a:ext cx="12192000" cy="6858000"/>
+          </a:xfrm>
+          <a:prstGeom prst="triangle">
+            <a:avLst/>
+          </a:prstGeom>
+          <a:solidFill>
+            <a:srgbClr val="C7974D"/>
+          </a:solidFill>
+          <a:ln>
+            <a:noFill/>
+          </a:ln>
+        </p:spPr>
+        <p:style>
+          <a:lnRef idx="2">
+            <a:schemeClr val="accent1">
+              <a:shade val="50000"/>
+            </a:schemeClr>
+          </a:lnRef>
+          <a:fillRef idx="1">
+            <a:schemeClr val="accent1"/>
+          </a:fillRef>
+          <a:effectRef idx="0">
+            <a:schemeClr val="accent1"/>
+          </a:effectRef>
+          <a:fontRef idx="minor">
+            <a:schemeClr val="lt1"/>
+          </a:fontRef>
+        </p:style>
+        <p:txBody>
+          <a:bodyPr rtlCol="0" anchor="ctr"/>
+          <a:lstStyle/>
+          <a:p>
+            <a:pPr algn="ctr"/>
+            <a:endParaRPr lang="de-DE" dirty="0"/>
+          </a:p>
+        </p:txBody>
+      </p:sp>
+      <p:pic>
+        <p:nvPicPr>
+          <p:cNvPr id="1028" name="Picture 4" descr="Berlin, Deutschland, Februar 2023: Sarah Wagenknecht, Mitglied des Bundestages, hat ein Friedensmanifest veröffentlicht und fordert Verhandlungen">
+            <a:extLst>
+              <a:ext uri="{FF2B5EF4-FFF2-40B4-BE49-F238E27FC236}">
+                <a16:creationId xmlns:a16="http://schemas.microsoft.com/office/drawing/2014/main" id="{455B14CF-5A65-117E-22AF-92E0FF41F00B}"/>
+              </a:ext>
+            </a:extLst>
+          </p:cNvPr>
+          <p:cNvPicPr>
+            <a:picLocks noChangeAspect="1" noChangeArrowheads="1"/>
+          </p:cNvPicPr>
+          <p:nvPr/>
+        </p:nvPicPr>
+        <p:blipFill rotWithShape="1">
+          <a:blip r:embed="rId2">
+            <a:extLst>
+              <a:ext uri="{28A0092B-C50C-407E-A947-70E740481C1C}">
+                <a14:useLocalDpi xmlns:a14="http://schemas.microsoft.com/office/drawing/2010/main" val="0"/>
+              </a:ext>
+            </a:extLst>
+          </a:blip>
+          <a:srcRect t="4107" r="18052"/>
+          <a:stretch/>
+        </p:blipFill>
+        <p:spPr bwMode="auto">
+          <a:xfrm>
+            <a:off x="52256" y="2927261"/>
+            <a:ext cx="2029460" cy="2557463"/>
+          </a:xfrm>
+          <a:custGeom>
+            <a:avLst/>
+            <a:gdLst>
+              <a:gd name="connsiteX0" fmla="*/ 0 w 2029460"/>
+              <a:gd name="connsiteY0" fmla="*/ 0 h 2557463"/>
+              <a:gd name="connsiteX1" fmla="*/ 656192 w 2029460"/>
+              <a:gd name="connsiteY1" fmla="*/ 0 h 2557463"/>
+              <a:gd name="connsiteX2" fmla="*/ 1292090 w 2029460"/>
+              <a:gd name="connsiteY2" fmla="*/ 0 h 2557463"/>
+              <a:gd name="connsiteX3" fmla="*/ 2029460 w 2029460"/>
+              <a:gd name="connsiteY3" fmla="*/ 0 h 2557463"/>
+              <a:gd name="connsiteX4" fmla="*/ 2029460 w 2029460"/>
+              <a:gd name="connsiteY4" fmla="*/ 562642 h 2557463"/>
+              <a:gd name="connsiteX5" fmla="*/ 2029460 w 2029460"/>
+              <a:gd name="connsiteY5" fmla="*/ 1202008 h 2557463"/>
+              <a:gd name="connsiteX6" fmla="*/ 2029460 w 2029460"/>
+              <a:gd name="connsiteY6" fmla="*/ 1841373 h 2557463"/>
+              <a:gd name="connsiteX7" fmla="*/ 2029460 w 2029460"/>
+              <a:gd name="connsiteY7" fmla="*/ 2557463 h 2557463"/>
+              <a:gd name="connsiteX8" fmla="*/ 1413857 w 2029460"/>
+              <a:gd name="connsiteY8" fmla="*/ 2557463 h 2557463"/>
+              <a:gd name="connsiteX9" fmla="*/ 757665 w 2029460"/>
+              <a:gd name="connsiteY9" fmla="*/ 2557463 h 2557463"/>
+              <a:gd name="connsiteX10" fmla="*/ 0 w 2029460"/>
+              <a:gd name="connsiteY10" fmla="*/ 2557463 h 2557463"/>
+              <a:gd name="connsiteX11" fmla="*/ 0 w 2029460"/>
+              <a:gd name="connsiteY11" fmla="*/ 1918097 h 2557463"/>
+              <a:gd name="connsiteX12" fmla="*/ 0 w 2029460"/>
+              <a:gd name="connsiteY12" fmla="*/ 1278732 h 2557463"/>
+              <a:gd name="connsiteX13" fmla="*/ 0 w 2029460"/>
+              <a:gd name="connsiteY13" fmla="*/ 690515 h 2557463"/>
+              <a:gd name="connsiteX14" fmla="*/ 0 w 2029460"/>
+              <a:gd name="connsiteY14" fmla="*/ 0 h 2557463"/>
+            </a:gdLst>
+            <a:ahLst/>
+            <a:cxnLst>
+              <a:cxn ang="0">
+                <a:pos x="connsiteX0" y="connsiteY0"/>
+              </a:cxn>
+              <a:cxn ang="0">
+                <a:pos x="connsiteX1" y="connsiteY1"/>
+              </a:cxn>
+              <a:cxn ang="0">
+                <a:pos x="connsiteX2" y="connsiteY2"/>
+              </a:cxn>
+              <a:cxn ang="0">
+                <a:pos x="connsiteX3" y="connsiteY3"/>
+              </a:cxn>
+              <a:cxn ang="0">
+                <a:pos x="connsiteX4" y="connsiteY4"/>
+              </a:cxn>
+              <a:cxn ang="0">
+                <a:pos x="connsiteX5" y="connsiteY5"/>
+              </a:cxn>
+              <a:cxn ang="0">
+                <a:pos x="connsiteX6" y="connsiteY6"/>
+              </a:cxn>
+              <a:cxn ang="0">
+                <a:pos x="connsiteX7" y="connsiteY7"/>
+              </a:cxn>
+              <a:cxn ang="0">
+                <a:pos x="connsiteX8" y="connsiteY8"/>
+              </a:cxn>
+              <a:cxn ang="0">
+                <a:pos x="connsiteX9" y="connsiteY9"/>
+              </a:cxn>
+              <a:cxn ang="0">
+                <a:pos x="connsiteX10" y="connsiteY10"/>
+              </a:cxn>
+              <a:cxn ang="0">
+                <a:pos x="connsiteX11" y="connsiteY11"/>
+              </a:cxn>
+              <a:cxn ang="0">
+                <a:pos x="connsiteX12" y="connsiteY12"/>
+              </a:cxn>
+              <a:cxn ang="0">
+                <a:pos x="connsiteX13" y="connsiteY13"/>
+              </a:cxn>
+              <a:cxn ang="0">
+                <a:pos x="connsiteX14" y="connsiteY14"/>
+              </a:cxn>
+            </a:cxnLst>
+            <a:rect l="l" t="t" r="r" b="b"/>
+            <a:pathLst>
+              <a:path w="2029460" h="2557463" extrusionOk="0">
+                <a:moveTo>
+                  <a:pt x="0" y="0"/>
+                </a:moveTo>
+                <a:cubicBezTo>
+                  <a:pt x="131416" y="9500"/>
+                  <a:pt x="467959" y="17605"/>
+                  <a:pt x="656192" y="0"/>
+                </a:cubicBezTo>
+                <a:cubicBezTo>
+                  <a:pt x="844425" y="-17605"/>
+                  <a:pt x="1025306" y="-18008"/>
+                  <a:pt x="1292090" y="0"/>
+                </a:cubicBezTo>
+                <a:cubicBezTo>
+                  <a:pt x="1558874" y="18008"/>
+                  <a:pt x="1877551" y="-29536"/>
+                  <a:pt x="2029460" y="0"/>
+                </a:cubicBezTo>
+                <a:cubicBezTo>
+                  <a:pt x="2013378" y="220630"/>
+                  <a:pt x="2003078" y="396950"/>
+                  <a:pt x="2029460" y="562642"/>
+                </a:cubicBezTo>
+                <a:cubicBezTo>
+                  <a:pt x="2055842" y="728334"/>
+                  <a:pt x="2018354" y="996740"/>
+                  <a:pt x="2029460" y="1202008"/>
+                </a:cubicBezTo>
+                <a:cubicBezTo>
+                  <a:pt x="2040566" y="1407276"/>
+                  <a:pt x="2053238" y="1569534"/>
+                  <a:pt x="2029460" y="1841373"/>
+                </a:cubicBezTo>
+                <a:cubicBezTo>
+                  <a:pt x="2005682" y="2113212"/>
+                  <a:pt x="2063640" y="2409273"/>
+                  <a:pt x="2029460" y="2557463"/>
+                </a:cubicBezTo>
+                <a:cubicBezTo>
+                  <a:pt x="1758519" y="2557112"/>
+                  <a:pt x="1546956" y="2535924"/>
+                  <a:pt x="1413857" y="2557463"/>
+                </a:cubicBezTo>
+                <a:cubicBezTo>
+                  <a:pt x="1280758" y="2579002"/>
+                  <a:pt x="929879" y="2541671"/>
+                  <a:pt x="757665" y="2557463"/>
+                </a:cubicBezTo>
+                <a:cubicBezTo>
+                  <a:pt x="585451" y="2573255"/>
+                  <a:pt x="245650" y="2526118"/>
+                  <a:pt x="0" y="2557463"/>
+                </a:cubicBezTo>
+                <a:cubicBezTo>
+                  <a:pt x="28089" y="2341493"/>
+                  <a:pt x="31502" y="2216567"/>
+                  <a:pt x="0" y="1918097"/>
+                </a:cubicBezTo>
+                <a:cubicBezTo>
+                  <a:pt x="-31502" y="1619627"/>
+                  <a:pt x="-22958" y="1443061"/>
+                  <a:pt x="0" y="1278732"/>
+                </a:cubicBezTo>
+                <a:cubicBezTo>
+                  <a:pt x="22958" y="1114404"/>
+                  <a:pt x="-27378" y="871314"/>
+                  <a:pt x="0" y="690515"/>
+                </a:cubicBezTo>
+                <a:cubicBezTo>
+                  <a:pt x="27378" y="509716"/>
+                  <a:pt x="6941" y="252531"/>
+                  <a:pt x="0" y="0"/>
+                </a:cubicBezTo>
+                <a:close/>
+              </a:path>
+            </a:pathLst>
+          </a:custGeom>
+          <a:noFill/>
+          <a:ln>
+            <a:noFill/>
+            <a:extLst>
+              <a:ext uri="{C807C97D-BFC1-408E-A445-0C87EB9F89A2}">
+                <ask:lineSketchStyleProps xmlns:ask="http://schemas.microsoft.com/office/drawing/2018/sketchyshapes" sd="559668610">
+                  <a:prstGeom prst="rect">
+                    <a:avLst/>
+                  </a:prstGeom>
+                  <ask:type>
+                    <ask:lineSketchFreehand/>
+                  </ask:type>
+                </ask:lineSketchStyleProps>
+              </a:ext>
+            </a:extLst>
+          </a:ln>
+          <a:extLst>
+            <a:ext uri="{909E8E84-426E-40DD-AFC4-6F175D3DCCD1}">
+              <a14:hiddenFill xmlns:a14="http://schemas.microsoft.com/office/drawing/2010/main">
+                <a:solidFill>
+                  <a:srgbClr val="FFFFFF"/>
+                </a:solidFill>
+              </a14:hiddenFill>
+            </a:ext>
+          </a:extLst>
+        </p:spPr>
+      </p:pic>
+      <p:pic>
+        <p:nvPicPr>
+          <p:cNvPr id="13" name="Grafik 12">
+            <a:extLst>
+              <a:ext uri="{FF2B5EF4-FFF2-40B4-BE49-F238E27FC236}">
+                <a16:creationId xmlns:a16="http://schemas.microsoft.com/office/drawing/2014/main" id="{02800703-FE54-83AD-F3C1-D877F74D4845}"/>
+              </a:ext>
+            </a:extLst>
+          </p:cNvPr>
+          <p:cNvPicPr>
+            <a:picLocks noChangeAspect="1"/>
+          </p:cNvPicPr>
+          <p:nvPr/>
+        </p:nvPicPr>
+        <p:blipFill rotWithShape="1">
+          <a:blip r:embed="rId3"/>
+          <a:srcRect l="-1476" t="1845" r="1476" b="21126"/>
+          <a:stretch/>
+        </p:blipFill>
+        <p:spPr>
+          <a:xfrm>
+            <a:off x="1496336" y="2244323"/>
+            <a:ext cx="2581263" cy="1988332"/>
+          </a:xfrm>
+          <a:prstGeom prst="rect">
+            <a:avLst/>
+          </a:prstGeom>
+        </p:spPr>
+      </p:pic>
+      <p:pic>
+        <p:nvPicPr>
+          <p:cNvPr id="3" name="Grafik 2">
+            <a:extLst>
+              <a:ext uri="{FF2B5EF4-FFF2-40B4-BE49-F238E27FC236}">
+                <a16:creationId xmlns:a16="http://schemas.microsoft.com/office/drawing/2014/main" id="{ED4B1E32-A9CF-2293-EE46-76E39E150B53}"/>
+              </a:ext>
+            </a:extLst>
+          </p:cNvPr>
+          <p:cNvPicPr>
+            <a:picLocks noChangeAspect="1"/>
+          </p:cNvPicPr>
+          <p:nvPr/>
+        </p:nvPicPr>
+        <p:blipFill rotWithShape="1">
+          <a:blip r:embed="rId4"/>
+          <a:srcRect b="32584"/>
+          <a:stretch/>
+        </p:blipFill>
+        <p:spPr>
+          <a:xfrm>
+            <a:off x="7892571" y="2244323"/>
+            <a:ext cx="3855721" cy="2599362"/>
+          </a:xfrm>
+          <a:prstGeom prst="rect">
+            <a:avLst/>
+          </a:prstGeom>
+        </p:spPr>
+      </p:pic>
+      <p:pic>
+        <p:nvPicPr>
+          <p:cNvPr id="5" name="Grafik 4">
+            <a:extLst>
+              <a:ext uri="{FF2B5EF4-FFF2-40B4-BE49-F238E27FC236}">
+                <a16:creationId xmlns:a16="http://schemas.microsoft.com/office/drawing/2014/main" id="{1297DF78-4975-0BC8-8A2B-2DF6D6B25C5E}"/>
+              </a:ext>
+            </a:extLst>
+          </p:cNvPr>
+          <p:cNvPicPr>
+            <a:picLocks noChangeAspect="1"/>
+          </p:cNvPicPr>
+          <p:nvPr/>
+        </p:nvPicPr>
+        <p:blipFill rotWithShape="1">
+          <a:blip r:embed="rId5"/>
+          <a:srcRect b="19672"/>
+          <a:stretch/>
+        </p:blipFill>
+        <p:spPr>
+          <a:xfrm>
+            <a:off x="9075419" y="967194"/>
+            <a:ext cx="3486150" cy="2800350"/>
+          </a:xfrm>
+          <a:prstGeom prst="rect">
+            <a:avLst/>
+          </a:prstGeom>
+        </p:spPr>
+      </p:pic>
+      <p:sp>
+        <p:nvSpPr>
+          <p:cNvPr id="11" name="Freihandform: Form 10">
+            <a:extLst>
+              <a:ext uri="{FF2B5EF4-FFF2-40B4-BE49-F238E27FC236}">
+                <a16:creationId xmlns:a16="http://schemas.microsoft.com/office/drawing/2014/main" id="{DC139BC7-D039-6397-A7BF-14D11616897F}"/>
+              </a:ext>
+            </a:extLst>
+          </p:cNvPr>
+          <p:cNvSpPr/>
+          <p:nvPr/>
+        </p:nvSpPr>
+        <p:spPr>
+          <a:xfrm>
+            <a:off x="1292896" y="4046449"/>
+            <a:ext cx="2784703" cy="2800350"/>
+          </a:xfrm>
+          <a:custGeom>
+            <a:avLst/>
+            <a:gdLst>
+              <a:gd name="connsiteX0" fmla="*/ 0 w 2305057"/>
+              <a:gd name="connsiteY0" fmla="*/ 2362200 h 2800350"/>
+              <a:gd name="connsiteX1" fmla="*/ 28575 w 2305057"/>
+              <a:gd name="connsiteY1" fmla="*/ 2238375 h 2800350"/>
+              <a:gd name="connsiteX2" fmla="*/ 38100 w 2305057"/>
+              <a:gd name="connsiteY2" fmla="*/ 2181225 h 2800350"/>
+              <a:gd name="connsiteX3" fmla="*/ 76200 w 2305057"/>
+              <a:gd name="connsiteY3" fmla="*/ 2047875 h 2800350"/>
+              <a:gd name="connsiteX4" fmla="*/ 85725 w 2305057"/>
+              <a:gd name="connsiteY4" fmla="*/ 2000250 h 2800350"/>
+              <a:gd name="connsiteX5" fmla="*/ 200025 w 2305057"/>
+              <a:gd name="connsiteY5" fmla="*/ 1857375 h 2800350"/>
+              <a:gd name="connsiteX6" fmla="*/ 295275 w 2305057"/>
+              <a:gd name="connsiteY6" fmla="*/ 1752600 h 2800350"/>
+              <a:gd name="connsiteX7" fmla="*/ 400050 w 2305057"/>
+              <a:gd name="connsiteY7" fmla="*/ 1628775 h 2800350"/>
+              <a:gd name="connsiteX8" fmla="*/ 466725 w 2305057"/>
+              <a:gd name="connsiteY8" fmla="*/ 1562100 h 2800350"/>
+              <a:gd name="connsiteX9" fmla="*/ 523875 w 2305057"/>
+              <a:gd name="connsiteY9" fmla="*/ 1543050 h 2800350"/>
+              <a:gd name="connsiteX10" fmla="*/ 552450 w 2305057"/>
+              <a:gd name="connsiteY10" fmla="*/ 1524000 h 2800350"/>
+              <a:gd name="connsiteX11" fmla="*/ 590550 w 2305057"/>
+              <a:gd name="connsiteY11" fmla="*/ 1514475 h 2800350"/>
+              <a:gd name="connsiteX12" fmla="*/ 628650 w 2305057"/>
+              <a:gd name="connsiteY12" fmla="*/ 1495425 h 2800350"/>
+              <a:gd name="connsiteX13" fmla="*/ 695325 w 2305057"/>
+              <a:gd name="connsiteY13" fmla="*/ 1419225 h 2800350"/>
+              <a:gd name="connsiteX14" fmla="*/ 714375 w 2305057"/>
+              <a:gd name="connsiteY14" fmla="*/ 1362075 h 2800350"/>
+              <a:gd name="connsiteX15" fmla="*/ 733425 w 2305057"/>
+              <a:gd name="connsiteY15" fmla="*/ 1314450 h 2800350"/>
+              <a:gd name="connsiteX16" fmla="*/ 742950 w 2305057"/>
+              <a:gd name="connsiteY16" fmla="*/ 1285875 h 2800350"/>
+              <a:gd name="connsiteX17" fmla="*/ 781050 w 2305057"/>
+              <a:gd name="connsiteY17" fmla="*/ 1209675 h 2800350"/>
+              <a:gd name="connsiteX18" fmla="*/ 819150 w 2305057"/>
+              <a:gd name="connsiteY18" fmla="*/ 1066800 h 2800350"/>
+              <a:gd name="connsiteX19" fmla="*/ 866775 w 2305057"/>
+              <a:gd name="connsiteY19" fmla="*/ 485775 h 2800350"/>
+              <a:gd name="connsiteX20" fmla="*/ 885825 w 2305057"/>
+              <a:gd name="connsiteY20" fmla="*/ 447675 h 2800350"/>
+              <a:gd name="connsiteX21" fmla="*/ 895350 w 2305057"/>
+              <a:gd name="connsiteY21" fmla="*/ 419100 h 2800350"/>
+              <a:gd name="connsiteX22" fmla="*/ 923925 w 2305057"/>
+              <a:gd name="connsiteY22" fmla="*/ 381000 h 2800350"/>
+              <a:gd name="connsiteX23" fmla="*/ 981075 w 2305057"/>
+              <a:gd name="connsiteY23" fmla="*/ 304800 h 2800350"/>
+              <a:gd name="connsiteX24" fmla="*/ 1019175 w 2305057"/>
+              <a:gd name="connsiteY24" fmla="*/ 257175 h 2800350"/>
+              <a:gd name="connsiteX25" fmla="*/ 1057275 w 2305057"/>
+              <a:gd name="connsiteY25" fmla="*/ 219075 h 2800350"/>
+              <a:gd name="connsiteX26" fmla="*/ 1076325 w 2305057"/>
+              <a:gd name="connsiteY26" fmla="*/ 190500 h 2800350"/>
+              <a:gd name="connsiteX27" fmla="*/ 1104900 w 2305057"/>
+              <a:gd name="connsiteY27" fmla="*/ 171450 h 2800350"/>
+              <a:gd name="connsiteX28" fmla="*/ 1190625 w 2305057"/>
+              <a:gd name="connsiteY28" fmla="*/ 104775 h 2800350"/>
+              <a:gd name="connsiteX29" fmla="*/ 1209675 w 2305057"/>
+              <a:gd name="connsiteY29" fmla="*/ 76200 h 2800350"/>
+              <a:gd name="connsiteX30" fmla="*/ 1362075 w 2305057"/>
+              <a:gd name="connsiteY30" fmla="*/ 0 h 2800350"/>
+              <a:gd name="connsiteX31" fmla="*/ 1562100 w 2305057"/>
+              <a:gd name="connsiteY31" fmla="*/ 38100 h 2800350"/>
+              <a:gd name="connsiteX32" fmla="*/ 1600200 w 2305057"/>
+              <a:gd name="connsiteY32" fmla="*/ 76200 h 2800350"/>
+              <a:gd name="connsiteX33" fmla="*/ 1638300 w 2305057"/>
+              <a:gd name="connsiteY33" fmla="*/ 104775 h 2800350"/>
+              <a:gd name="connsiteX34" fmla="*/ 1666875 w 2305057"/>
+              <a:gd name="connsiteY34" fmla="*/ 142875 h 2800350"/>
+              <a:gd name="connsiteX35" fmla="*/ 1724025 w 2305057"/>
+              <a:gd name="connsiteY35" fmla="*/ 209550 h 2800350"/>
+              <a:gd name="connsiteX36" fmla="*/ 1733550 w 2305057"/>
+              <a:gd name="connsiteY36" fmla="*/ 266700 h 2800350"/>
+              <a:gd name="connsiteX37" fmla="*/ 1743075 w 2305057"/>
+              <a:gd name="connsiteY37" fmla="*/ 295275 h 2800350"/>
+              <a:gd name="connsiteX38" fmla="*/ 1762125 w 2305057"/>
+              <a:gd name="connsiteY38" fmla="*/ 609600 h 2800350"/>
+              <a:gd name="connsiteX39" fmla="*/ 1790700 w 2305057"/>
+              <a:gd name="connsiteY39" fmla="*/ 733425 h 2800350"/>
+              <a:gd name="connsiteX40" fmla="*/ 1800225 w 2305057"/>
+              <a:gd name="connsiteY40" fmla="*/ 904875 h 2800350"/>
+              <a:gd name="connsiteX41" fmla="*/ 1809750 w 2305057"/>
+              <a:gd name="connsiteY41" fmla="*/ 933450 h 2800350"/>
+              <a:gd name="connsiteX42" fmla="*/ 1828800 w 2305057"/>
+              <a:gd name="connsiteY42" fmla="*/ 1076325 h 2800350"/>
+              <a:gd name="connsiteX43" fmla="*/ 1838325 w 2305057"/>
+              <a:gd name="connsiteY43" fmla="*/ 1162050 h 2800350"/>
+              <a:gd name="connsiteX44" fmla="*/ 1847850 w 2305057"/>
+              <a:gd name="connsiteY44" fmla="*/ 1390650 h 2800350"/>
+              <a:gd name="connsiteX45" fmla="*/ 1981200 w 2305057"/>
+              <a:gd name="connsiteY45" fmla="*/ 1524000 h 2800350"/>
+              <a:gd name="connsiteX46" fmla="*/ 1990725 w 2305057"/>
+              <a:gd name="connsiteY46" fmla="*/ 1581150 h 2800350"/>
+              <a:gd name="connsiteX47" fmla="*/ 2028825 w 2305057"/>
+              <a:gd name="connsiteY47" fmla="*/ 1609725 h 2800350"/>
+              <a:gd name="connsiteX48" fmla="*/ 2057400 w 2305057"/>
+              <a:gd name="connsiteY48" fmla="*/ 1638300 h 2800350"/>
+              <a:gd name="connsiteX49" fmla="*/ 2124075 w 2305057"/>
+              <a:gd name="connsiteY49" fmla="*/ 1685925 h 2800350"/>
+              <a:gd name="connsiteX50" fmla="*/ 2162175 w 2305057"/>
+              <a:gd name="connsiteY50" fmla="*/ 1733550 h 2800350"/>
+              <a:gd name="connsiteX51" fmla="*/ 2276475 w 2305057"/>
+              <a:gd name="connsiteY51" fmla="*/ 1838325 h 2800350"/>
+              <a:gd name="connsiteX52" fmla="*/ 2305050 w 2305057"/>
+              <a:gd name="connsiteY52" fmla="*/ 1990725 h 2800350"/>
+              <a:gd name="connsiteX53" fmla="*/ 2286000 w 2305057"/>
+              <a:gd name="connsiteY53" fmla="*/ 2562225 h 2800350"/>
+              <a:gd name="connsiteX54" fmla="*/ 2105025 w 2305057"/>
+              <a:gd name="connsiteY54" fmla="*/ 2686050 h 2800350"/>
+              <a:gd name="connsiteX55" fmla="*/ 1933575 w 2305057"/>
+              <a:gd name="connsiteY55" fmla="*/ 2752725 h 2800350"/>
+              <a:gd name="connsiteX56" fmla="*/ 1695450 w 2305057"/>
+              <a:gd name="connsiteY56" fmla="*/ 2790825 h 2800350"/>
+              <a:gd name="connsiteX57" fmla="*/ 1647825 w 2305057"/>
+              <a:gd name="connsiteY57" fmla="*/ 2800350 h 2800350"/>
+              <a:gd name="connsiteX58" fmla="*/ 1390650 w 2305057"/>
+              <a:gd name="connsiteY58" fmla="*/ 2781300 h 2800350"/>
+              <a:gd name="connsiteX59" fmla="*/ 990600 w 2305057"/>
+              <a:gd name="connsiteY59" fmla="*/ 2771775 h 2800350"/>
+              <a:gd name="connsiteX60" fmla="*/ 752475 w 2305057"/>
+              <a:gd name="connsiteY60" fmla="*/ 2752725 h 2800350"/>
+              <a:gd name="connsiteX61" fmla="*/ 685800 w 2305057"/>
+              <a:gd name="connsiteY61" fmla="*/ 2743200 h 2800350"/>
+              <a:gd name="connsiteX62" fmla="*/ 523875 w 2305057"/>
+              <a:gd name="connsiteY62" fmla="*/ 2714625 h 2800350"/>
+              <a:gd name="connsiteX63" fmla="*/ 390525 w 2305057"/>
+              <a:gd name="connsiteY63" fmla="*/ 2686050 h 2800350"/>
+              <a:gd name="connsiteX64" fmla="*/ 276225 w 2305057"/>
+              <a:gd name="connsiteY64" fmla="*/ 2628900 h 2800350"/>
+              <a:gd name="connsiteX65" fmla="*/ 171450 w 2305057"/>
+              <a:gd name="connsiteY65" fmla="*/ 2543175 h 2800350"/>
+              <a:gd name="connsiteX66" fmla="*/ 133350 w 2305057"/>
+              <a:gd name="connsiteY66" fmla="*/ 2495550 h 2800350"/>
+              <a:gd name="connsiteX67" fmla="*/ 104775 w 2305057"/>
+              <a:gd name="connsiteY67" fmla="*/ 2486025 h 2800350"/>
+              <a:gd name="connsiteX68" fmla="*/ 85725 w 2305057"/>
+              <a:gd name="connsiteY68" fmla="*/ 2447925 h 2800350"/>
+              <a:gd name="connsiteX69" fmla="*/ 66675 w 2305057"/>
+              <a:gd name="connsiteY69" fmla="*/ 2381250 h 2800350"/>
+              <a:gd name="connsiteX70" fmla="*/ 57150 w 2305057"/>
+              <a:gd name="connsiteY70" fmla="*/ 2352675 h 2800350"/>
+              <a:gd name="connsiteX71" fmla="*/ 47625 w 2305057"/>
+              <a:gd name="connsiteY71" fmla="*/ 2314575 h 2800350"/>
+              <a:gd name="connsiteX72" fmla="*/ 19050 w 2305057"/>
+              <a:gd name="connsiteY72" fmla="*/ 2276475 h 2800350"/>
+            </a:gdLst>
+            <a:ahLst/>
+            <a:cxnLst>
+              <a:cxn ang="0">
+                <a:pos x="connsiteX0" y="connsiteY0"/>
+              </a:cxn>
+              <a:cxn ang="0">
+                <a:pos x="connsiteX1" y="connsiteY1"/>
+              </a:cxn>
+              <a:cxn ang="0">
+                <a:pos x="connsiteX2" y="connsiteY2"/>
+              </a:cxn>
+              <a:cxn ang="0">
+                <a:pos x="connsiteX3" y="connsiteY3"/>
+              </a:cxn>
+              <a:cxn ang="0">
+                <a:pos x="connsiteX4" y="connsiteY4"/>
+              </a:cxn>
+              <a:cxn ang="0">
+                <a:pos x="connsiteX5" y="connsiteY5"/>
+              </a:cxn>
+              <a:cxn ang="0">
+                <a:pos x="connsiteX6" y="connsiteY6"/>
+              </a:cxn>
+              <a:cxn ang="0">
+                <a:pos x="connsiteX7" y="connsiteY7"/>
+              </a:cxn>
+              <a:cxn ang="0">
+                <a:pos x="connsiteX8" y="connsiteY8"/>
+              </a:cxn>
+              <a:cxn ang="0">
+                <a:pos x="connsiteX9" y="connsiteY9"/>
+              </a:cxn>
+              <a:cxn ang="0">
+                <a:pos x="connsiteX10" y="connsiteY10"/>
+              </a:cxn>
+              <a:cxn ang="0">
+                <a:pos x="connsiteX11" y="connsiteY11"/>
+              </a:cxn>
+              <a:cxn ang="0">
+                <a:pos x="connsiteX12" y="connsiteY12"/>
+              </a:cxn>
+              <a:cxn ang="0">
+                <a:pos x="connsiteX13" y="connsiteY13"/>
+              </a:cxn>
+              <a:cxn ang="0">
+                <a:pos x="connsiteX14" y="connsiteY14"/>
+              </a:cxn>
+              <a:cxn ang="0">
+                <a:pos x="connsiteX15" y="connsiteY15"/>
+              </a:cxn>
+              <a:cxn ang="0">
+                <a:pos x="connsiteX16" y="connsiteY16"/>
+              </a:cxn>
+              <a:cxn ang="0">
+                <a:pos x="connsiteX17" y="connsiteY17"/>
+              </a:cxn>
+              <a:cxn ang="0">
+                <a:pos x="connsiteX18" y="connsiteY18"/>
+              </a:cxn>
+              <a:cxn ang="0">
+                <a:pos x="connsiteX19" y="connsiteY19"/>
+              </a:cxn>
+              <a:cxn ang="0">
+                <a:pos x="connsiteX20" y="connsiteY20"/>
+              </a:cxn>
+              <a:cxn ang="0">
+                <a:pos x="connsiteX21" y="connsiteY21"/>
+              </a:cxn>
+              <a:cxn ang="0">
+                <a:pos x="connsiteX22" y="connsiteY22"/>
+              </a:cxn>
+              <a:cxn ang="0">
+                <a:pos x="connsiteX23" y="connsiteY23"/>
+              </a:cxn>
+              <a:cxn ang="0">
+                <a:pos x="connsiteX24" y="connsiteY24"/>
+              </a:cxn>
+              <a:cxn ang="0">
+                <a:pos x="connsiteX25" y="connsiteY25"/>
+              </a:cxn>
+              <a:cxn ang="0">
+                <a:pos x="connsiteX26" y="connsiteY26"/>
+              </a:cxn>
+              <a:cxn ang="0">
+                <a:pos x="connsiteX27" y="connsiteY27"/>
+              </a:cxn>
+              <a:cxn ang="0">
+                <a:pos x="connsiteX28" y="connsiteY28"/>
+              </a:cxn>
+              <a:cxn ang="0">
+                <a:pos x="connsiteX29" y="connsiteY29"/>
+              </a:cxn>
+              <a:cxn ang="0">
+                <a:pos x="connsiteX30" y="connsiteY30"/>
+              </a:cxn>
+              <a:cxn ang="0">
+                <a:pos x="connsiteX31" y="connsiteY31"/>
+              </a:cxn>
+              <a:cxn ang="0">
+                <a:pos x="connsiteX32" y="connsiteY32"/>
+              </a:cxn>
+              <a:cxn ang="0">
+                <a:pos x="connsiteX33" y="connsiteY33"/>
+              </a:cxn>
+              <a:cxn ang="0">
+                <a:pos x="connsiteX34" y="connsiteY34"/>
+              </a:cxn>
+              <a:cxn ang="0">
+                <a:pos x="connsiteX35" y="connsiteY35"/>
+              </a:cxn>
+              <a:cxn ang="0">
+                <a:pos x="connsiteX36" y="connsiteY36"/>
+              </a:cxn>
+              <a:cxn ang="0">
+                <a:pos x="connsiteX37" y="connsiteY37"/>
+              </a:cxn>
+              <a:cxn ang="0">
+                <a:pos x="connsiteX38" y="connsiteY38"/>
+              </a:cxn>
+              <a:cxn ang="0">
+                <a:pos x="connsiteX39" y="connsiteY39"/>
+              </a:cxn>
+              <a:cxn ang="0">
+                <a:pos x="connsiteX40" y="connsiteY40"/>
+              </a:cxn>
+              <a:cxn ang="0">
+                <a:pos x="connsiteX41" y="connsiteY41"/>
+              </a:cxn>
+              <a:cxn ang="0">
+                <a:pos x="connsiteX42" y="connsiteY42"/>
+              </a:cxn>
+              <a:cxn ang="0">
+                <a:pos x="connsiteX43" y="connsiteY43"/>
+              </a:cxn>
+              <a:cxn ang="0">
+                <a:pos x="connsiteX44" y="connsiteY44"/>
+              </a:cxn>
+              <a:cxn ang="0">
+                <a:pos x="connsiteX45" y="connsiteY45"/>
+              </a:cxn>
+              <a:cxn ang="0">
+                <a:pos x="connsiteX46" y="connsiteY46"/>
+              </a:cxn>
+              <a:cxn ang="0">
+                <a:pos x="connsiteX47" y="connsiteY47"/>
+              </a:cxn>
+              <a:cxn ang="0">
+                <a:pos x="connsiteX48" y="connsiteY48"/>
+              </a:cxn>
+              <a:cxn ang="0">
+                <a:pos x="connsiteX49" y="connsiteY49"/>
+              </a:cxn>
+              <a:cxn ang="0">
+                <a:pos x="connsiteX50" y="connsiteY50"/>
+              </a:cxn>
+              <a:cxn ang="0">
+                <a:pos x="connsiteX51" y="connsiteY51"/>
+              </a:cxn>
+              <a:cxn ang="0">
+                <a:pos x="connsiteX52" y="connsiteY52"/>
+              </a:cxn>
+              <a:cxn ang="0">
+                <a:pos x="connsiteX53" y="connsiteY53"/>
+              </a:cxn>
+              <a:cxn ang="0">
+                <a:pos x="connsiteX54" y="connsiteY54"/>
+              </a:cxn>
+              <a:cxn ang="0">
+                <a:pos x="connsiteX55" y="connsiteY55"/>
+              </a:cxn>
+              <a:cxn ang="0">
+                <a:pos x="connsiteX56" y="connsiteY56"/>
+              </a:cxn>
+              <a:cxn ang="0">
+                <a:pos x="connsiteX57" y="connsiteY57"/>
+              </a:cxn>
+              <a:cxn ang="0">
+                <a:pos x="connsiteX58" y="connsiteY58"/>
+              </a:cxn>
+              <a:cxn ang="0">
+                <a:pos x="connsiteX59" y="connsiteY59"/>
+              </a:cxn>
+              <a:cxn ang="0">
+                <a:pos x="connsiteX60" y="connsiteY60"/>
+              </a:cxn>
+              <a:cxn ang="0">
+                <a:pos x="connsiteX61" y="connsiteY61"/>
+              </a:cxn>
+              <a:cxn ang="0">
+                <a:pos x="connsiteX62" y="connsiteY62"/>
+              </a:cxn>
+              <a:cxn ang="0">
+                <a:pos x="connsiteX63" y="connsiteY63"/>
+              </a:cxn>
+              <a:cxn ang="0">
+                <a:pos x="connsiteX64" y="connsiteY64"/>
+              </a:cxn>
+              <a:cxn ang="0">
+                <a:pos x="connsiteX65" y="connsiteY65"/>
+              </a:cxn>
+              <a:cxn ang="0">
+                <a:pos x="connsiteX66" y="connsiteY66"/>
+              </a:cxn>
+              <a:cxn ang="0">
+                <a:pos x="connsiteX67" y="connsiteY67"/>
+              </a:cxn>
+              <a:cxn ang="0">
+                <a:pos x="connsiteX68" y="connsiteY68"/>
+              </a:cxn>
+              <a:cxn ang="0">
+                <a:pos x="connsiteX69" y="connsiteY69"/>
+              </a:cxn>
+              <a:cxn ang="0">
+                <a:pos x="connsiteX70" y="connsiteY70"/>
+              </a:cxn>
+              <a:cxn ang="0">
+                <a:pos x="connsiteX71" y="connsiteY71"/>
+              </a:cxn>
+              <a:cxn ang="0">
+                <a:pos x="connsiteX72" y="connsiteY72"/>
+              </a:cxn>
+            </a:cxnLst>
+            <a:rect l="l" t="t" r="r" b="b"/>
+            <a:pathLst>
+              <a:path w="2305057" h="2800350">
+                <a:moveTo>
+                  <a:pt x="0" y="2362200"/>
+                </a:moveTo>
+                <a:cubicBezTo>
+                  <a:pt x="9525" y="2320925"/>
+                  <a:pt x="19848" y="2279826"/>
+                  <a:pt x="28575" y="2238375"/>
+                </a:cubicBezTo>
+                <a:cubicBezTo>
+                  <a:pt x="32554" y="2219476"/>
+                  <a:pt x="34312" y="2200163"/>
+                  <a:pt x="38100" y="2181225"/>
+                </a:cubicBezTo>
+                <a:cubicBezTo>
+                  <a:pt x="45870" y="2142376"/>
+                  <a:pt x="68665" y="2076130"/>
+                  <a:pt x="76200" y="2047875"/>
+                </a:cubicBezTo>
+                <a:cubicBezTo>
+                  <a:pt x="80371" y="2032232"/>
+                  <a:pt x="78150" y="2014558"/>
+                  <a:pt x="85725" y="2000250"/>
+                </a:cubicBezTo>
+                <a:cubicBezTo>
+                  <a:pt x="221395" y="1743984"/>
+                  <a:pt x="107728" y="1958063"/>
+                  <a:pt x="200025" y="1857375"/>
+                </a:cubicBezTo>
+                <a:cubicBezTo>
+                  <a:pt x="307571" y="1740052"/>
+                  <a:pt x="225877" y="1798865"/>
+                  <a:pt x="295275" y="1752600"/>
+                </a:cubicBezTo>
+                <a:cubicBezTo>
+                  <a:pt x="318999" y="1681428"/>
+                  <a:pt x="297700" y="1731125"/>
+                  <a:pt x="400050" y="1628775"/>
+                </a:cubicBezTo>
+                <a:cubicBezTo>
+                  <a:pt x="422275" y="1606550"/>
+                  <a:pt x="436907" y="1572039"/>
+                  <a:pt x="466725" y="1562100"/>
+                </a:cubicBezTo>
+                <a:cubicBezTo>
+                  <a:pt x="485775" y="1555750"/>
+                  <a:pt x="505525" y="1551205"/>
+                  <a:pt x="523875" y="1543050"/>
+                </a:cubicBezTo>
+                <a:cubicBezTo>
+                  <a:pt x="534336" y="1538401"/>
+                  <a:pt x="541928" y="1528509"/>
+                  <a:pt x="552450" y="1524000"/>
+                </a:cubicBezTo>
+                <a:cubicBezTo>
+                  <a:pt x="564482" y="1518843"/>
+                  <a:pt x="578293" y="1519072"/>
+                  <a:pt x="590550" y="1514475"/>
+                </a:cubicBezTo>
+                <a:cubicBezTo>
+                  <a:pt x="603845" y="1509489"/>
+                  <a:pt x="615950" y="1501775"/>
+                  <a:pt x="628650" y="1495425"/>
+                </a:cubicBezTo>
+                <a:cubicBezTo>
+                  <a:pt x="650875" y="1470025"/>
+                  <a:pt x="677074" y="1447615"/>
+                  <a:pt x="695325" y="1419225"/>
+                </a:cubicBezTo>
+                <a:cubicBezTo>
+                  <a:pt x="706184" y="1402334"/>
+                  <a:pt x="707513" y="1380946"/>
+                  <a:pt x="714375" y="1362075"/>
+                </a:cubicBezTo>
+                <a:cubicBezTo>
+                  <a:pt x="720218" y="1346007"/>
+                  <a:pt x="727422" y="1330459"/>
+                  <a:pt x="733425" y="1314450"/>
+                </a:cubicBezTo>
+                <a:cubicBezTo>
+                  <a:pt x="736950" y="1305049"/>
+                  <a:pt x="738795" y="1295015"/>
+                  <a:pt x="742950" y="1285875"/>
+                </a:cubicBezTo>
+                <a:cubicBezTo>
+                  <a:pt x="754701" y="1260022"/>
+                  <a:pt x="772070" y="1236616"/>
+                  <a:pt x="781050" y="1209675"/>
+                </a:cubicBezTo>
+                <a:cubicBezTo>
+                  <a:pt x="809357" y="1124755"/>
+                  <a:pt x="795744" y="1172127"/>
+                  <a:pt x="819150" y="1066800"/>
+                </a:cubicBezTo>
+                <a:cubicBezTo>
+                  <a:pt x="835025" y="873125"/>
+                  <a:pt x="845968" y="678982"/>
+                  <a:pt x="866775" y="485775"/>
+                </a:cubicBezTo>
+                <a:cubicBezTo>
+                  <a:pt x="868295" y="471658"/>
+                  <a:pt x="880232" y="460726"/>
+                  <a:pt x="885825" y="447675"/>
+                </a:cubicBezTo>
+                <a:cubicBezTo>
+                  <a:pt x="889780" y="438447"/>
+                  <a:pt x="890369" y="427817"/>
+                  <a:pt x="895350" y="419100"/>
+                </a:cubicBezTo>
+                <a:cubicBezTo>
+                  <a:pt x="903226" y="405317"/>
+                  <a:pt x="914400" y="393700"/>
+                  <a:pt x="923925" y="381000"/>
+                </a:cubicBezTo>
+                <a:cubicBezTo>
+                  <a:pt x="941989" y="326808"/>
+                  <a:pt x="923131" y="369182"/>
+                  <a:pt x="981075" y="304800"/>
+                </a:cubicBezTo>
+                <a:cubicBezTo>
+                  <a:pt x="994675" y="289689"/>
+                  <a:pt x="1005669" y="272370"/>
+                  <a:pt x="1019175" y="257175"/>
+                </a:cubicBezTo>
+                <a:cubicBezTo>
+                  <a:pt x="1031107" y="243751"/>
+                  <a:pt x="1045586" y="232712"/>
+                  <a:pt x="1057275" y="219075"/>
+                </a:cubicBezTo>
+                <a:cubicBezTo>
+                  <a:pt x="1064725" y="210383"/>
+                  <a:pt x="1068230" y="198595"/>
+                  <a:pt x="1076325" y="190500"/>
+                </a:cubicBezTo>
+                <a:cubicBezTo>
+                  <a:pt x="1084420" y="182405"/>
+                  <a:pt x="1096106" y="178779"/>
+                  <a:pt x="1104900" y="171450"/>
+                </a:cubicBezTo>
+                <a:cubicBezTo>
+                  <a:pt x="1194429" y="96843"/>
+                  <a:pt x="1046182" y="201070"/>
+                  <a:pt x="1190625" y="104775"/>
+                </a:cubicBezTo>
+                <a:cubicBezTo>
+                  <a:pt x="1196975" y="95250"/>
+                  <a:pt x="1200815" y="83449"/>
+                  <a:pt x="1209675" y="76200"/>
+                </a:cubicBezTo>
+                <a:cubicBezTo>
+                  <a:pt x="1284766" y="14762"/>
+                  <a:pt x="1282480" y="22742"/>
+                  <a:pt x="1362075" y="0"/>
+                </a:cubicBezTo>
+                <a:cubicBezTo>
+                  <a:pt x="1428750" y="12700"/>
+                  <a:pt x="1497455" y="17414"/>
+                  <a:pt x="1562100" y="38100"/>
+                </a:cubicBezTo>
+                <a:cubicBezTo>
+                  <a:pt x="1579206" y="43574"/>
+                  <a:pt x="1586683" y="64373"/>
+                  <a:pt x="1600200" y="76200"/>
+                </a:cubicBezTo>
+                <a:cubicBezTo>
+                  <a:pt x="1612147" y="86654"/>
+                  <a:pt x="1627075" y="93550"/>
+                  <a:pt x="1638300" y="104775"/>
+                </a:cubicBezTo>
+                <a:cubicBezTo>
+                  <a:pt x="1649525" y="116000"/>
+                  <a:pt x="1656421" y="130928"/>
+                  <a:pt x="1666875" y="142875"/>
+                </a:cubicBezTo>
+                <a:cubicBezTo>
+                  <a:pt x="1731548" y="216787"/>
+                  <a:pt x="1683235" y="148365"/>
+                  <a:pt x="1724025" y="209550"/>
+                </a:cubicBezTo>
+                <a:cubicBezTo>
+                  <a:pt x="1727200" y="228600"/>
+                  <a:pt x="1729360" y="247847"/>
+                  <a:pt x="1733550" y="266700"/>
+                </a:cubicBezTo>
+                <a:cubicBezTo>
+                  <a:pt x="1735728" y="276501"/>
+                  <a:pt x="1742241" y="285269"/>
+                  <a:pt x="1743075" y="295275"/>
+                </a:cubicBezTo>
+                <a:cubicBezTo>
+                  <a:pt x="1751792" y="399880"/>
+                  <a:pt x="1754646" y="504900"/>
+                  <a:pt x="1762125" y="609600"/>
+                </a:cubicBezTo>
+                <a:cubicBezTo>
+                  <a:pt x="1768596" y="700193"/>
+                  <a:pt x="1761075" y="674175"/>
+                  <a:pt x="1790700" y="733425"/>
+                </a:cubicBezTo>
+                <a:cubicBezTo>
+                  <a:pt x="1793875" y="790575"/>
+                  <a:pt x="1794798" y="847895"/>
+                  <a:pt x="1800225" y="904875"/>
+                </a:cubicBezTo>
+                <a:cubicBezTo>
+                  <a:pt x="1801177" y="914870"/>
+                  <a:pt x="1808330" y="923511"/>
+                  <a:pt x="1809750" y="933450"/>
+                </a:cubicBezTo>
+                <a:cubicBezTo>
+                  <a:pt x="1834740" y="1108383"/>
+                  <a:pt x="1805439" y="982880"/>
+                  <a:pt x="1828800" y="1076325"/>
+                </a:cubicBezTo>
+                <a:cubicBezTo>
+                  <a:pt x="1831975" y="1104900"/>
+                  <a:pt x="1836586" y="1133352"/>
+                  <a:pt x="1838325" y="1162050"/>
+                </a:cubicBezTo>
+                <a:cubicBezTo>
+                  <a:pt x="1842939" y="1238176"/>
+                  <a:pt x="1819848" y="1319711"/>
+                  <a:pt x="1847850" y="1390650"/>
+                </a:cubicBezTo>
+                <a:cubicBezTo>
+                  <a:pt x="1870931" y="1449121"/>
+                  <a:pt x="1981200" y="1524000"/>
+                  <a:pt x="1981200" y="1524000"/>
+                </a:cubicBezTo>
+                <a:cubicBezTo>
+                  <a:pt x="1984375" y="1543050"/>
+                  <a:pt x="1981346" y="1564268"/>
+                  <a:pt x="1990725" y="1581150"/>
+                </a:cubicBezTo>
+                <a:cubicBezTo>
+                  <a:pt x="1998435" y="1595027"/>
+                  <a:pt x="2016772" y="1599394"/>
+                  <a:pt x="2028825" y="1609725"/>
+                </a:cubicBezTo>
+                <a:cubicBezTo>
+                  <a:pt x="2039052" y="1618491"/>
+                  <a:pt x="2047052" y="1629676"/>
+                  <a:pt x="2057400" y="1638300"/>
+                </a:cubicBezTo>
+                <a:cubicBezTo>
+                  <a:pt x="2089850" y="1665342"/>
+                  <a:pt x="2089760" y="1651610"/>
+                  <a:pt x="2124075" y="1685925"/>
+                </a:cubicBezTo>
+                <a:cubicBezTo>
+                  <a:pt x="2138450" y="1700300"/>
+                  <a:pt x="2147064" y="1719950"/>
+                  <a:pt x="2162175" y="1733550"/>
+                </a:cubicBezTo>
+                <a:cubicBezTo>
+                  <a:pt x="2314998" y="1871091"/>
+                  <a:pt x="2113244" y="1647889"/>
+                  <a:pt x="2276475" y="1838325"/>
+                </a:cubicBezTo>
+                <a:cubicBezTo>
+                  <a:pt x="2281956" y="1862988"/>
+                  <a:pt x="2305528" y="1958713"/>
+                  <a:pt x="2305050" y="1990725"/>
+                </a:cubicBezTo>
+                <a:cubicBezTo>
+                  <a:pt x="2302205" y="2181310"/>
+                  <a:pt x="2308598" y="2372964"/>
+                  <a:pt x="2286000" y="2562225"/>
+                </a:cubicBezTo>
+                <a:cubicBezTo>
+                  <a:pt x="2278366" y="2626159"/>
+                  <a:pt x="2132586" y="2674492"/>
+                  <a:pt x="2105025" y="2686050"/>
+                </a:cubicBezTo>
+                <a:cubicBezTo>
+                  <a:pt x="2048477" y="2709764"/>
+                  <a:pt x="1992981" y="2737528"/>
+                  <a:pt x="1933575" y="2752725"/>
+                </a:cubicBezTo>
+                <a:cubicBezTo>
+                  <a:pt x="1855698" y="2772647"/>
+                  <a:pt x="1774274" y="2775060"/>
+                  <a:pt x="1695450" y="2790825"/>
+                </a:cubicBezTo>
+                <a:lnTo>
+                  <a:pt x="1647825" y="2800350"/>
+                </a:lnTo>
+                <a:cubicBezTo>
+                  <a:pt x="1500194" y="2708081"/>
+                  <a:pt x="1641259" y="2773083"/>
+                  <a:pt x="1390650" y="2781300"/>
+                </a:cubicBezTo>
+                <a:lnTo>
+                  <a:pt x="990600" y="2771775"/>
+                </a:lnTo>
+                <a:cubicBezTo>
+                  <a:pt x="856534" y="2749431"/>
+                  <a:pt x="1006942" y="2772299"/>
+                  <a:pt x="752475" y="2752725"/>
+                </a:cubicBezTo>
+                <a:cubicBezTo>
+                  <a:pt x="730090" y="2751003"/>
+                  <a:pt x="708054" y="2746167"/>
+                  <a:pt x="685800" y="2743200"/>
+                </a:cubicBezTo>
+                <a:cubicBezTo>
+                  <a:pt x="535126" y="2723110"/>
+                  <a:pt x="686537" y="2747157"/>
+                  <a:pt x="523875" y="2714625"/>
+                </a:cubicBezTo>
+                <a:cubicBezTo>
+                  <a:pt x="479592" y="2705768"/>
+                  <a:pt x="433007" y="2703043"/>
+                  <a:pt x="390525" y="2686050"/>
+                </a:cubicBezTo>
+                <a:cubicBezTo>
+                  <a:pt x="350975" y="2670230"/>
+                  <a:pt x="306346" y="2659021"/>
+                  <a:pt x="276225" y="2628900"/>
+                </a:cubicBezTo>
+                <a:cubicBezTo>
+                  <a:pt x="205984" y="2558659"/>
+                  <a:pt x="242177" y="2585611"/>
+                  <a:pt x="171450" y="2543175"/>
+                </a:cubicBezTo>
+                <a:cubicBezTo>
+                  <a:pt x="158750" y="2527300"/>
+                  <a:pt x="148786" y="2508781"/>
+                  <a:pt x="133350" y="2495550"/>
+                </a:cubicBezTo>
+                <a:cubicBezTo>
+                  <a:pt x="125727" y="2489016"/>
+                  <a:pt x="111875" y="2493125"/>
+                  <a:pt x="104775" y="2486025"/>
+                </a:cubicBezTo>
+                <a:cubicBezTo>
+                  <a:pt x="94735" y="2475985"/>
+                  <a:pt x="91318" y="2460976"/>
+                  <a:pt x="85725" y="2447925"/>
+                </a:cubicBezTo>
+                <a:cubicBezTo>
+                  <a:pt x="75937" y="2425087"/>
+                  <a:pt x="73580" y="2405417"/>
+                  <a:pt x="66675" y="2381250"/>
+                </a:cubicBezTo>
+                <a:cubicBezTo>
+                  <a:pt x="63917" y="2371596"/>
+                  <a:pt x="59908" y="2362329"/>
+                  <a:pt x="57150" y="2352675"/>
+                </a:cubicBezTo>
+                <a:cubicBezTo>
+                  <a:pt x="53554" y="2340088"/>
+                  <a:pt x="53479" y="2326284"/>
+                  <a:pt x="47625" y="2314575"/>
+                </a:cubicBezTo>
+                <a:cubicBezTo>
+                  <a:pt x="40525" y="2300376"/>
+                  <a:pt x="19050" y="2276475"/>
+                  <a:pt x="19050" y="2276475"/>
+                </a:cubicBezTo>
+              </a:path>
+            </a:pathLst>
+          </a:custGeom>
+          <a:blipFill dpi="0" rotWithShape="1">
+            <a:blip r:embed="rId6">
+              <a:extLst>
+                <a:ext uri="{28A0092B-C50C-407E-A947-70E740481C1C}">
+                  <a14:useLocalDpi xmlns:a14="http://schemas.microsoft.com/office/drawing/2010/main" val="0"/>
+                </a:ext>
+              </a:extLst>
+            </a:blip>
+            <a:srcRect/>
+            <a:stretch>
+              <a:fillRect/>
+            </a:stretch>
+          </a:blipFill>
+          <a:ln>
+            <a:noFill/>
+          </a:ln>
+        </p:spPr>
+        <p:style>
+          <a:lnRef idx="2">
+            <a:schemeClr val="accent1">
+              <a:shade val="50000"/>
+            </a:schemeClr>
+          </a:lnRef>
+          <a:fillRef idx="1">
+            <a:schemeClr val="accent1"/>
+          </a:fillRef>
+          <a:effectRef idx="0">
+            <a:schemeClr val="accent1"/>
+          </a:effectRef>
+          <a:fontRef idx="minor">
+            <a:schemeClr val="lt1"/>
+          </a:fontRef>
+        </p:style>
+        <p:txBody>
+          <a:bodyPr rtlCol="0" anchor="ctr"/>
+          <a:lstStyle/>
+          <a:p>
+            <a:pPr algn="ctr"/>
+            <a:endParaRPr lang="de-DE"/>
+          </a:p>
+        </p:txBody>
+      </p:sp>
+      <p:sp>
+        <p:nvSpPr>
+          <p:cNvPr id="15" name="Textfeld 14">
+            <a:extLst>
+              <a:ext uri="{FF2B5EF4-FFF2-40B4-BE49-F238E27FC236}">
+                <a16:creationId xmlns:a16="http://schemas.microsoft.com/office/drawing/2014/main" id="{042A46E2-CDAE-D282-8B53-1C7A13835030}"/>
+              </a:ext>
+            </a:extLst>
+          </p:cNvPr>
+          <p:cNvSpPr txBox="1"/>
+          <p:nvPr/>
+        </p:nvSpPr>
+        <p:spPr>
+          <a:xfrm>
+            <a:off x="8551190" y="4800539"/>
+            <a:ext cx="3009899" cy="400110"/>
+          </a:xfrm>
+          <a:prstGeom prst="rect">
+            <a:avLst/>
+          </a:prstGeom>
+          <a:noFill/>
+        </p:spPr>
+        <p:txBody>
+          <a:bodyPr wrap="square" rtlCol="0">
+            <a:spAutoFit/>
+          </a:bodyPr>
+          <a:lstStyle/>
+          <a:p>
+            <a:r>
+              <a:rPr lang="de-DE" sz="1000" b="1" dirty="0" err="1">
+                <a:latin typeface="Aharoni" panose="02010803020104030203" pitchFamily="2" charset="-79"/>
+                <a:cs typeface="Aharoni" panose="02010803020104030203" pitchFamily="2" charset="-79"/>
+              </a:rPr>
+              <a:t>Created</a:t>
+            </a:r>
+            <a:r>
+              <a:rPr lang="de-DE" sz="1000" b="1" dirty="0">
+                <a:latin typeface="Aharoni" panose="02010803020104030203" pitchFamily="2" charset="-79"/>
+                <a:cs typeface="Aharoni" panose="02010803020104030203" pitchFamily="2" charset="-79"/>
+              </a:rPr>
+              <a:t> </a:t>
+            </a:r>
+            <a:r>
+              <a:rPr lang="de-DE" sz="1000" b="1" dirty="0" err="1">
+                <a:latin typeface="Aharoni" panose="02010803020104030203" pitchFamily="2" charset="-79"/>
+                <a:cs typeface="Aharoni" panose="02010803020104030203" pitchFamily="2" charset="-79"/>
+              </a:rPr>
+              <a:t>by</a:t>
+            </a:r>
+            <a:r>
+              <a:rPr lang="de-DE" sz="1000" b="1" dirty="0">
+                <a:latin typeface="Aharoni" panose="02010803020104030203" pitchFamily="2" charset="-79"/>
+                <a:cs typeface="Aharoni" panose="02010803020104030203" pitchFamily="2" charset="-79"/>
+              </a:rPr>
+              <a:t> leo-graph.com</a:t>
+            </a:r>
+          </a:p>
+          <a:p>
+            <a:r>
+              <a:rPr lang="de-DE" sz="1000" b="1" dirty="0" err="1">
+                <a:latin typeface="Aharoni" panose="02010803020104030203" pitchFamily="2" charset="-79"/>
+                <a:cs typeface="Aharoni" panose="02010803020104030203" pitchFamily="2" charset="-79"/>
+              </a:rPr>
+              <a:t>from</a:t>
+            </a:r>
+            <a:r>
+              <a:rPr lang="de-DE" sz="1000" b="1" dirty="0">
+                <a:latin typeface="Aharoni" panose="02010803020104030203" pitchFamily="2" charset="-79"/>
+                <a:cs typeface="Aharoni" panose="02010803020104030203" pitchFamily="2" charset="-79"/>
+              </a:rPr>
+              <a:t> </a:t>
+            </a:r>
+            <a:r>
+              <a:rPr lang="de-DE" sz="1000" b="1" dirty="0" err="1">
+                <a:latin typeface="Aharoni" panose="02010803020104030203" pitchFamily="2" charset="-79"/>
+                <a:cs typeface="Aharoni" panose="02010803020104030203" pitchFamily="2" charset="-79"/>
+              </a:rPr>
+              <a:t>the</a:t>
+            </a:r>
+            <a:r>
+              <a:rPr lang="de-DE" sz="1000" b="1" dirty="0">
+                <a:latin typeface="Aharoni" panose="02010803020104030203" pitchFamily="2" charset="-79"/>
+                <a:cs typeface="Aharoni" panose="02010803020104030203" pitchFamily="2" charset="-79"/>
+              </a:rPr>
+              <a:t> </a:t>
+            </a:r>
+            <a:r>
+              <a:rPr lang="de-DE" sz="1000" b="1" dirty="0" err="1">
+                <a:latin typeface="Aharoni" panose="02010803020104030203" pitchFamily="2" charset="-79"/>
+                <a:cs typeface="Aharoni" panose="02010803020104030203" pitchFamily="2" charset="-79"/>
+              </a:rPr>
+              <a:t>Noun</a:t>
+            </a:r>
+            <a:r>
+              <a:rPr lang="de-DE" sz="1000" b="1" dirty="0">
+                <a:latin typeface="Aharoni" panose="02010803020104030203" pitchFamily="2" charset="-79"/>
+                <a:cs typeface="Aharoni" panose="02010803020104030203" pitchFamily="2" charset="-79"/>
+              </a:rPr>
+              <a:t> Project</a:t>
+            </a:r>
+          </a:p>
+        </p:txBody>
+      </p:sp>
+      <p:pic>
+        <p:nvPicPr>
+          <p:cNvPr id="16" name="Grafik 15">
+            <a:extLst>
+              <a:ext uri="{FF2B5EF4-FFF2-40B4-BE49-F238E27FC236}">
+                <a16:creationId xmlns:a16="http://schemas.microsoft.com/office/drawing/2014/main" id="{584826B3-3690-4C33-2CF0-1C1911AF00A7}"/>
+              </a:ext>
+            </a:extLst>
+          </p:cNvPr>
+          <p:cNvPicPr>
+            <a:picLocks noChangeAspect="1"/>
+          </p:cNvPicPr>
+          <p:nvPr/>
+        </p:nvPicPr>
+        <p:blipFill rotWithShape="1">
+          <a:blip r:embed="rId3"/>
+          <a:srcRect l="9445" t="185008" r="-9445" b="-100506"/>
+          <a:stretch/>
+        </p:blipFill>
+        <p:spPr>
+          <a:xfrm>
+            <a:off x="1558402" y="2857500"/>
+            <a:ext cx="2581263" cy="400050"/>
+          </a:xfrm>
+          <a:prstGeom prst="rect">
+            <a:avLst/>
+          </a:prstGeom>
+        </p:spPr>
+      </p:pic>
+      <p:pic>
+        <p:nvPicPr>
+          <p:cNvPr id="17" name="Grafik 16">
+            <a:extLst>
+              <a:ext uri="{FF2B5EF4-FFF2-40B4-BE49-F238E27FC236}">
+                <a16:creationId xmlns:a16="http://schemas.microsoft.com/office/drawing/2014/main" id="{1FE2199C-AD2B-85BD-8F40-E5AA91655A88}"/>
+              </a:ext>
+            </a:extLst>
+          </p:cNvPr>
+          <p:cNvPicPr>
+            <a:picLocks noChangeAspect="1"/>
+          </p:cNvPicPr>
+          <p:nvPr/>
+        </p:nvPicPr>
+        <p:blipFill rotWithShape="1">
+          <a:blip r:embed="rId3"/>
+          <a:srcRect t="82426"/>
+          <a:stretch/>
+        </p:blipFill>
+        <p:spPr>
+          <a:xfrm>
+            <a:off x="267770" y="2244323"/>
+            <a:ext cx="2581263" cy="453633"/>
+          </a:xfrm>
+          <a:prstGeom prst="rect">
+            <a:avLst/>
+          </a:prstGeom>
+        </p:spPr>
+      </p:pic>
+      <p:pic>
+        <p:nvPicPr>
+          <p:cNvPr id="18" name="Grafik 17">
+            <a:extLst>
+              <a:ext uri="{FF2B5EF4-FFF2-40B4-BE49-F238E27FC236}">
+                <a16:creationId xmlns:a16="http://schemas.microsoft.com/office/drawing/2014/main" id="{79136893-3785-ECA9-8481-321EB3263597}"/>
+              </a:ext>
+            </a:extLst>
+          </p:cNvPr>
+          <p:cNvPicPr>
+            <a:picLocks noChangeAspect="1"/>
+          </p:cNvPicPr>
+          <p:nvPr/>
+        </p:nvPicPr>
+        <p:blipFill rotWithShape="1">
+          <a:blip r:embed="rId5"/>
+          <a:srcRect t="84427"/>
+          <a:stretch/>
+        </p:blipFill>
+        <p:spPr>
+          <a:xfrm>
+            <a:off x="8463940" y="424300"/>
+            <a:ext cx="3486150" cy="542894"/>
+          </a:xfrm>
+          <a:prstGeom prst="rect">
+            <a:avLst/>
+          </a:prstGeom>
+        </p:spPr>
+      </p:pic>
+    </p:spTree>
+    <p:extLst>
+      <p:ext uri="{BB962C8B-B14F-4D97-AF65-F5344CB8AC3E}">
+        <p14:creationId xmlns:p14="http://schemas.microsoft.com/office/powerpoint/2010/main" val="2068298696"/>
+      </p:ext>
+    </p:extLst>
+  </p:cSld>
+  <p:clrMapOvr>
+    <a:masterClrMapping/>
+  </p:clrMapOvr>
+</p:sld>
+</file>
+
 <file path=ppt/theme/theme1.xml><?xml version="1.0" encoding="utf-8"?>
 <a:theme xmlns:a="http://schemas.openxmlformats.org/drawingml/2006/main" name="Office">
   <a:themeElements>

</xml_diff>